<commit_message>
código base e estático para lista de tracks
</commit_message>
<xml_diff>
--- a/checkpoint3/52.pptx
+++ b/checkpoint3/52.pptx
@@ -221,7 +221,7 @@
           <a:p>
             <a:fld id="{745C36E7-9E00-462E-80A3-32F2BE615C7A}" type="datetimeFigureOut">
               <a:rPr lang="en-US" smtClean="0"/>
-              <a:t>10/28/19</a:t>
+              <a:t>10/28/2019</a:t>
             </a:fld>
             <a:endParaRPr lang="en-US"/>
           </a:p>
@@ -387,7 +387,7 @@
             <a:fld id="{01F3E309-ED8D-4193-99AF-E5EA90965E98}" type="datetimeFigureOut">
               <a:rPr lang="en-US" smtClean="0"/>
               <a:pPr/>
-              <a:t>10/28/19</a:t>
+              <a:t>10/28/2019</a:t>
             </a:fld>
             <a:endParaRPr lang="en-US"/>
           </a:p>
@@ -1404,7 +1404,7 @@
             <a:fld id="{F3CC9924-33BC-4796-B0F9-D37DB5D899BF}" type="datetimeFigureOut">
               <a:rPr lang="pt-PT" smtClean="0"/>
               <a:pPr/>
-              <a:t>28/10/19</a:t>
+              <a:t>28/10/2019</a:t>
             </a:fld>
             <a:endParaRPr lang="pt-PT"/>
           </a:p>

</xml_diff>